<commit_message>
Updated the format to IEEE
Addressed more of Jeanine's comments
</commit_message>
<xml_diff>
--- a/illustrations/agas_intern.pptx
+++ b/illustrations/agas_intern.pptx
@@ -243,7 +243,7 @@
           <a:p>
             <a:fld id="{8AEA4B98-962A-9242-A474-F50A27DD8826}" type="datetimeFigureOut">
               <a:rPr lang="en-US" smtClean="0"/>
-              <a:t>9/8/17</a:t>
+              <a:t>8/12/18</a:t>
             </a:fld>
             <a:endParaRPr lang="en-US"/>
           </a:p>
@@ -413,7 +413,7 @@
           <a:p>
             <a:fld id="{8AEA4B98-962A-9242-A474-F50A27DD8826}" type="datetimeFigureOut">
               <a:rPr lang="en-US" smtClean="0"/>
-              <a:t>9/8/17</a:t>
+              <a:t>8/12/18</a:t>
             </a:fld>
             <a:endParaRPr lang="en-US"/>
           </a:p>
@@ -593,7 +593,7 @@
           <a:p>
             <a:fld id="{8AEA4B98-962A-9242-A474-F50A27DD8826}" type="datetimeFigureOut">
               <a:rPr lang="en-US" smtClean="0"/>
-              <a:t>9/8/17</a:t>
+              <a:t>8/12/18</a:t>
             </a:fld>
             <a:endParaRPr lang="en-US"/>
           </a:p>
@@ -763,7 +763,7 @@
           <a:p>
             <a:fld id="{8AEA4B98-962A-9242-A474-F50A27DD8826}" type="datetimeFigureOut">
               <a:rPr lang="en-US" smtClean="0"/>
-              <a:t>9/8/17</a:t>
+              <a:t>8/12/18</a:t>
             </a:fld>
             <a:endParaRPr lang="en-US"/>
           </a:p>
@@ -1009,7 +1009,7 @@
           <a:p>
             <a:fld id="{8AEA4B98-962A-9242-A474-F50A27DD8826}" type="datetimeFigureOut">
               <a:rPr lang="en-US" smtClean="0"/>
-              <a:t>9/8/17</a:t>
+              <a:t>8/12/18</a:t>
             </a:fld>
             <a:endParaRPr lang="en-US"/>
           </a:p>
@@ -1241,7 +1241,7 @@
           <a:p>
             <a:fld id="{8AEA4B98-962A-9242-A474-F50A27DD8826}" type="datetimeFigureOut">
               <a:rPr lang="en-US" smtClean="0"/>
-              <a:t>9/8/17</a:t>
+              <a:t>8/12/18</a:t>
             </a:fld>
             <a:endParaRPr lang="en-US"/>
           </a:p>
@@ -1608,7 +1608,7 @@
           <a:p>
             <a:fld id="{8AEA4B98-962A-9242-A474-F50A27DD8826}" type="datetimeFigureOut">
               <a:rPr lang="en-US" smtClean="0"/>
-              <a:t>9/8/17</a:t>
+              <a:t>8/12/18</a:t>
             </a:fld>
             <a:endParaRPr lang="en-US"/>
           </a:p>
@@ -1726,7 +1726,7 @@
           <a:p>
             <a:fld id="{8AEA4B98-962A-9242-A474-F50A27DD8826}" type="datetimeFigureOut">
               <a:rPr lang="en-US" smtClean="0"/>
-              <a:t>9/8/17</a:t>
+              <a:t>8/12/18</a:t>
             </a:fld>
             <a:endParaRPr lang="en-US"/>
           </a:p>
@@ -1821,7 +1821,7 @@
           <a:p>
             <a:fld id="{8AEA4B98-962A-9242-A474-F50A27DD8826}" type="datetimeFigureOut">
               <a:rPr lang="en-US" smtClean="0"/>
-              <a:t>9/8/17</a:t>
+              <a:t>8/12/18</a:t>
             </a:fld>
             <a:endParaRPr lang="en-US"/>
           </a:p>
@@ -2098,7 +2098,7 @@
           <a:p>
             <a:fld id="{8AEA4B98-962A-9242-A474-F50A27DD8826}" type="datetimeFigureOut">
               <a:rPr lang="en-US" smtClean="0"/>
-              <a:t>9/8/17</a:t>
+              <a:t>8/12/18</a:t>
             </a:fld>
             <a:endParaRPr lang="en-US"/>
           </a:p>
@@ -2351,7 +2351,7 @@
           <a:p>
             <a:fld id="{8AEA4B98-962A-9242-A474-F50A27DD8826}" type="datetimeFigureOut">
               <a:rPr lang="en-US" smtClean="0"/>
-              <a:t>9/8/17</a:t>
+              <a:t>8/12/18</a:t>
             </a:fld>
             <a:endParaRPr lang="en-US"/>
           </a:p>
@@ -2564,7 +2564,7 @@
           <a:p>
             <a:fld id="{8AEA4B98-962A-9242-A474-F50A27DD8826}" type="datetimeFigureOut">
               <a:rPr lang="en-US" smtClean="0"/>
-              <a:t>9/8/17</a:t>
+              <a:t>8/12/18</a:t>
             </a:fld>
             <a:endParaRPr lang="en-US"/>
           </a:p>
@@ -3383,7 +3383,7 @@
         </p:nvSpPr>
         <p:spPr>
           <a:xfrm>
-            <a:off x="7553070" y="4268868"/>
+            <a:off x="3587277" y="5815776"/>
             <a:ext cx="753732" cy="369332"/>
           </a:xfrm>
           <a:prstGeom prst="rect">
@@ -3412,7 +3412,7 @@
         </p:nvSpPr>
         <p:spPr>
           <a:xfrm>
-            <a:off x="7553070" y="4638200"/>
+            <a:off x="3587277" y="6185108"/>
             <a:ext cx="804672" cy="292608"/>
           </a:xfrm>
           <a:prstGeom prst="rect">
@@ -3470,7 +3470,7 @@
         </p:nvSpPr>
         <p:spPr>
           <a:xfrm>
-            <a:off x="8620925" y="4638200"/>
+            <a:off x="4655132" y="6185108"/>
             <a:ext cx="1073409" cy="292608"/>
           </a:xfrm>
           <a:prstGeom prst="rect">
@@ -4112,7 +4112,7 @@
         </p:nvCxnSpPr>
         <p:spPr>
           <a:xfrm>
-            <a:off x="8357742" y="4784504"/>
+            <a:off x="4391949" y="6331412"/>
             <a:ext cx="263183" cy="0"/>
           </a:xfrm>
           <a:prstGeom prst="straightConnector1">
@@ -4148,7 +4148,7 @@
         </p:nvSpPr>
         <p:spPr>
           <a:xfrm>
-            <a:off x="9694334" y="4638200"/>
+            <a:off x="5728541" y="6185108"/>
             <a:ext cx="1693333" cy="292608"/>
           </a:xfrm>
           <a:prstGeom prst="rect">

</xml_diff>